<commit_message>
commit modified exp files
</commit_message>
<xml_diff>
--- a/experiments/earth_mover/diagrams.pptx
+++ b/experiments/earth_mover/diagrams.pptx
@@ -288,7 +288,7 @@
           <a:p>
             <a:fld id="{051FF7C9-DE67-974D-9301-F551A8C1455C}" type="datetimeFigureOut">
               <a:rPr lang="en-US" smtClean="0"/>
-              <a:t>14/02/17</a:t>
+              <a:t>11/06/17</a:t>
             </a:fld>
             <a:endParaRPr lang="en-US"/>
           </a:p>
@@ -458,7 +458,7 @@
           <a:p>
             <a:fld id="{051FF7C9-DE67-974D-9301-F551A8C1455C}" type="datetimeFigureOut">
               <a:rPr lang="en-US" smtClean="0"/>
-              <a:t>14/02/17</a:t>
+              <a:t>11/06/17</a:t>
             </a:fld>
             <a:endParaRPr lang="en-US"/>
           </a:p>
@@ -638,7 +638,7 @@
           <a:p>
             <a:fld id="{051FF7C9-DE67-974D-9301-F551A8C1455C}" type="datetimeFigureOut">
               <a:rPr lang="en-US" smtClean="0"/>
-              <a:t>14/02/17</a:t>
+              <a:t>11/06/17</a:t>
             </a:fld>
             <a:endParaRPr lang="en-US"/>
           </a:p>
@@ -808,7 +808,7 @@
           <a:p>
             <a:fld id="{051FF7C9-DE67-974D-9301-F551A8C1455C}" type="datetimeFigureOut">
               <a:rPr lang="en-US" smtClean="0"/>
-              <a:t>14/02/17</a:t>
+              <a:t>11/06/17</a:t>
             </a:fld>
             <a:endParaRPr lang="en-US"/>
           </a:p>
@@ -1054,7 +1054,7 @@
           <a:p>
             <a:fld id="{051FF7C9-DE67-974D-9301-F551A8C1455C}" type="datetimeFigureOut">
               <a:rPr lang="en-US" smtClean="0"/>
-              <a:t>14/02/17</a:t>
+              <a:t>11/06/17</a:t>
             </a:fld>
             <a:endParaRPr lang="en-US"/>
           </a:p>
@@ -1342,7 +1342,7 @@
           <a:p>
             <a:fld id="{051FF7C9-DE67-974D-9301-F551A8C1455C}" type="datetimeFigureOut">
               <a:rPr lang="en-US" smtClean="0"/>
-              <a:t>14/02/17</a:t>
+              <a:t>11/06/17</a:t>
             </a:fld>
             <a:endParaRPr lang="en-US"/>
           </a:p>
@@ -1764,7 +1764,7 @@
           <a:p>
             <a:fld id="{051FF7C9-DE67-974D-9301-F551A8C1455C}" type="datetimeFigureOut">
               <a:rPr lang="en-US" smtClean="0"/>
-              <a:t>14/02/17</a:t>
+              <a:t>11/06/17</a:t>
             </a:fld>
             <a:endParaRPr lang="en-US"/>
           </a:p>
@@ -1882,7 +1882,7 @@
           <a:p>
             <a:fld id="{051FF7C9-DE67-974D-9301-F551A8C1455C}" type="datetimeFigureOut">
               <a:rPr lang="en-US" smtClean="0"/>
-              <a:t>14/02/17</a:t>
+              <a:t>11/06/17</a:t>
             </a:fld>
             <a:endParaRPr lang="en-US"/>
           </a:p>
@@ -1977,7 +1977,7 @@
           <a:p>
             <a:fld id="{051FF7C9-DE67-974D-9301-F551A8C1455C}" type="datetimeFigureOut">
               <a:rPr lang="en-US" smtClean="0"/>
-              <a:t>14/02/17</a:t>
+              <a:t>11/06/17</a:t>
             </a:fld>
             <a:endParaRPr lang="en-US"/>
           </a:p>
@@ -2254,7 +2254,7 @@
           <a:p>
             <a:fld id="{051FF7C9-DE67-974D-9301-F551A8C1455C}" type="datetimeFigureOut">
               <a:rPr lang="en-US" smtClean="0"/>
-              <a:t>14/02/17</a:t>
+              <a:t>11/06/17</a:t>
             </a:fld>
             <a:endParaRPr lang="en-US"/>
           </a:p>
@@ -2507,7 +2507,7 @@
           <a:p>
             <a:fld id="{051FF7C9-DE67-974D-9301-F551A8C1455C}" type="datetimeFigureOut">
               <a:rPr lang="en-US" smtClean="0"/>
-              <a:t>14/02/17</a:t>
+              <a:t>11/06/17</a:t>
             </a:fld>
             <a:endParaRPr lang="en-US"/>
           </a:p>
@@ -2720,7 +2720,7 @@
           <a:p>
             <a:fld id="{051FF7C9-DE67-974D-9301-F551A8C1455C}" type="datetimeFigureOut">
               <a:rPr lang="en-US" smtClean="0"/>
-              <a:t>14/02/17</a:t>
+              <a:t>11/06/17</a:t>
             </a:fld>
             <a:endParaRPr lang="en-US"/>
           </a:p>
@@ -3478,17 +3478,12 @@
           <a:p>
             <a:r>
               <a:rPr lang="en-US" sz="1100" dirty="0" smtClean="0"/>
-              <a:t>f(x</a:t>
-            </a:r>
-            <a:r>
-              <a:rPr lang="en-US" sz="1100" dirty="0" smtClean="0"/>
-              <a:t>)</a:t>
+              <a:t>f(x)</a:t>
             </a:r>
             <a:r>
               <a:rPr lang="en-US" sz="1100" baseline="-25000" dirty="0"/>
               <a:t>1</a:t>
             </a:r>
-            <a:endParaRPr lang="en-US" sz="1100" baseline="-25000" dirty="0"/>
           </a:p>
         </p:txBody>
       </p:sp>
@@ -3516,11 +3511,15 @@
           <a:p>
             <a:r>
               <a:rPr lang="en-US" sz="1100" dirty="0" smtClean="0"/>
-              <a:t>f(x)</a:t>
-            </a:r>
-            <a:r>
-              <a:rPr lang="en-US" sz="1100" baseline="-25000" dirty="0" smtClean="0"/>
-              <a:t>k</a:t>
+              <a:t>f(x</a:t>
+            </a:r>
+            <a:r>
+              <a:rPr lang="en-US" sz="1100" dirty="0" smtClean="0"/>
+              <a:t>)</a:t>
+            </a:r>
+            <a:r>
+              <a:rPr lang="en-US" sz="1100" baseline="-25000" dirty="0"/>
+              <a:t>K</a:t>
             </a:r>
             <a:endParaRPr lang="en-US" sz="1100" baseline="-25000" dirty="0"/>
           </a:p>
@@ -3726,11 +3725,7 @@
           <a:p>
             <a:r>
               <a:rPr lang="en-US" sz="1100" dirty="0" smtClean="0"/>
-              <a:t>f(x</a:t>
-            </a:r>
-            <a:r>
-              <a:rPr lang="en-US" sz="1100" dirty="0" smtClean="0"/>
-              <a:t>)</a:t>
+              <a:t>f(x)</a:t>
             </a:r>
             <a:endParaRPr lang="en-US" sz="1100" baseline="-25000" dirty="0"/>
           </a:p>
@@ -4154,15 +4149,7 @@
           <a:p>
             <a:r>
               <a:rPr lang="en-US" sz="1100" dirty="0" smtClean="0"/>
-              <a:t>1*log f</a:t>
-            </a:r>
-            <a:r>
-              <a:rPr lang="en-US" sz="1100" dirty="0" smtClean="0"/>
-              <a:t>(x</a:t>
-            </a:r>
-            <a:r>
-              <a:rPr lang="en-US" sz="1100" dirty="0" smtClean="0"/>
-              <a:t>)</a:t>
+              <a:t>1*log f(x)</a:t>
             </a:r>
             <a:r>
               <a:rPr lang="en-US" sz="1100" baseline="-25000" dirty="0" smtClean="0"/>
@@ -4187,7 +4174,7 @@
         <p:spPr>
           <a:xfrm>
             <a:off x="3455370" y="2502575"/>
-            <a:ext cx="979755" cy="430887"/>
+            <a:ext cx="988484" cy="430887"/>
           </a:xfrm>
           <a:prstGeom prst="rect">
             <a:avLst/>
@@ -4202,29 +4189,33 @@
           <a:p>
             <a:r>
               <a:rPr lang="en-US" sz="1100" dirty="0"/>
-              <a:t>k</a:t>
+              <a:t>K</a:t>
             </a:r>
             <a:r>
               <a:rPr lang="en-US" sz="1100" dirty="0" smtClean="0"/>
-              <a:t>*log f</a:t>
+              <a:t>*</a:t>
             </a:r>
             <a:r>
               <a:rPr lang="en-US" sz="1100" dirty="0" smtClean="0"/>
-              <a:t>(x</a:t>
+              <a:t>log f(x)</a:t>
+            </a:r>
+            <a:r>
+              <a:rPr lang="en-US" sz="1100" baseline="-25000" dirty="0" smtClean="0"/>
+              <a:t> </a:t>
+            </a:r>
+          </a:p>
+          <a:p>
+            <a:r>
+              <a:rPr lang="en-US" sz="1100" dirty="0" smtClean="0"/>
+              <a:t>– f(x) – log</a:t>
+            </a:r>
+            <a:r>
+              <a:rPr lang="en-US" sz="1100" dirty="0" smtClean="0"/>
+              <a:t>(K!</a:t>
             </a:r>
             <a:r>
               <a:rPr lang="en-US" sz="1100" dirty="0" smtClean="0"/>
               <a:t>)</a:t>
-            </a:r>
-            <a:r>
-              <a:rPr lang="en-US" sz="1100" baseline="-25000" dirty="0" smtClean="0"/>
-              <a:t> </a:t>
-            </a:r>
-          </a:p>
-          <a:p>
-            <a:r>
-              <a:rPr lang="en-US" sz="1100" dirty="0" smtClean="0"/>
-              <a:t>– f(x) – log(k!)</a:t>
             </a:r>
             <a:endParaRPr lang="en-US" sz="1100" baseline="-25000" dirty="0"/>
           </a:p>

</xml_diff>